<commit_message>
added real real one
</commit_message>
<xml_diff>
--- a/lab03/Lab3_Presentation.pptx
+++ b/lab03/Lab3_Presentation.pptx
@@ -9,11 +9,14 @@
     <p:sldId id="264" r:id="rId3"/>
     <p:sldId id="257" r:id="rId4"/>
     <p:sldId id="258" r:id="rId5"/>
-    <p:sldId id="259" r:id="rId6"/>
-    <p:sldId id="260" r:id="rId7"/>
-    <p:sldId id="261" r:id="rId8"/>
-    <p:sldId id="262" r:id="rId9"/>
-    <p:sldId id="263" r:id="rId10"/>
+    <p:sldId id="265" r:id="rId6"/>
+    <p:sldId id="259" r:id="rId7"/>
+    <p:sldId id="260" r:id="rId8"/>
+    <p:sldId id="266" r:id="rId9"/>
+    <p:sldId id="261" r:id="rId10"/>
+    <p:sldId id="262" r:id="rId11"/>
+    <p:sldId id="263" r:id="rId12"/>
+    <p:sldId id="267" r:id="rId13"/>
   </p:sldIdLst>
   <p:sldSz cx="9144000" cy="6858000" type="screen4x3"/>
   <p:notesSz cx="6858000" cy="9144000"/>
@@ -296,7 +299,7 @@
           <a:p>
             <a:fld id="{6D427EF5-151B-9248-9B7F-B76F70F3FF39}" type="datetimeFigureOut">
               <a:rPr lang="en-US" smtClean="0"/>
-              <a:t>2/19/15</a:t>
+              <a:t>2/20/15</a:t>
             </a:fld>
             <a:endParaRPr lang="en-US"/>
           </a:p>
@@ -466,7 +469,7 @@
           <a:p>
             <a:fld id="{6D427EF5-151B-9248-9B7F-B76F70F3FF39}" type="datetimeFigureOut">
               <a:rPr lang="en-US" smtClean="0"/>
-              <a:t>2/19/15</a:t>
+              <a:t>2/20/15</a:t>
             </a:fld>
             <a:endParaRPr lang="en-US"/>
           </a:p>
@@ -646,7 +649,7 @@
           <a:p>
             <a:fld id="{6D427EF5-151B-9248-9B7F-B76F70F3FF39}" type="datetimeFigureOut">
               <a:rPr lang="en-US" smtClean="0"/>
-              <a:t>2/19/15</a:t>
+              <a:t>2/20/15</a:t>
             </a:fld>
             <a:endParaRPr lang="en-US"/>
           </a:p>
@@ -816,7 +819,7 @@
           <a:p>
             <a:fld id="{6D427EF5-151B-9248-9B7F-B76F70F3FF39}" type="datetimeFigureOut">
               <a:rPr lang="en-US" smtClean="0"/>
-              <a:t>2/19/15</a:t>
+              <a:t>2/20/15</a:t>
             </a:fld>
             <a:endParaRPr lang="en-US"/>
           </a:p>
@@ -1062,7 +1065,7 @@
           <a:p>
             <a:fld id="{6D427EF5-151B-9248-9B7F-B76F70F3FF39}" type="datetimeFigureOut">
               <a:rPr lang="en-US" smtClean="0"/>
-              <a:t>2/19/15</a:t>
+              <a:t>2/20/15</a:t>
             </a:fld>
             <a:endParaRPr lang="en-US"/>
           </a:p>
@@ -1350,7 +1353,7 @@
           <a:p>
             <a:fld id="{6D427EF5-151B-9248-9B7F-B76F70F3FF39}" type="datetimeFigureOut">
               <a:rPr lang="en-US" smtClean="0"/>
-              <a:t>2/19/15</a:t>
+              <a:t>2/20/15</a:t>
             </a:fld>
             <a:endParaRPr lang="en-US"/>
           </a:p>
@@ -1772,7 +1775,7 @@
           <a:p>
             <a:fld id="{6D427EF5-151B-9248-9B7F-B76F70F3FF39}" type="datetimeFigureOut">
               <a:rPr lang="en-US" smtClean="0"/>
-              <a:t>2/19/15</a:t>
+              <a:t>2/20/15</a:t>
             </a:fld>
             <a:endParaRPr lang="en-US"/>
           </a:p>
@@ -1890,7 +1893,7 @@
           <a:p>
             <a:fld id="{6D427EF5-151B-9248-9B7F-B76F70F3FF39}" type="datetimeFigureOut">
               <a:rPr lang="en-US" smtClean="0"/>
-              <a:t>2/19/15</a:t>
+              <a:t>2/20/15</a:t>
             </a:fld>
             <a:endParaRPr lang="en-US"/>
           </a:p>
@@ -1985,7 +1988,7 @@
           <a:p>
             <a:fld id="{6D427EF5-151B-9248-9B7F-B76F70F3FF39}" type="datetimeFigureOut">
               <a:rPr lang="en-US" smtClean="0"/>
-              <a:t>2/19/15</a:t>
+              <a:t>2/20/15</a:t>
             </a:fld>
             <a:endParaRPr lang="en-US"/>
           </a:p>
@@ -2262,7 +2265,7 @@
           <a:p>
             <a:fld id="{6D427EF5-151B-9248-9B7F-B76F70F3FF39}" type="datetimeFigureOut">
               <a:rPr lang="en-US" smtClean="0"/>
-              <a:t>2/19/15</a:t>
+              <a:t>2/20/15</a:t>
             </a:fld>
             <a:endParaRPr lang="en-US"/>
           </a:p>
@@ -2515,7 +2518,7 @@
           <a:p>
             <a:fld id="{6D427EF5-151B-9248-9B7F-B76F70F3FF39}" type="datetimeFigureOut">
               <a:rPr lang="en-US" smtClean="0"/>
-              <a:t>2/19/15</a:t>
+              <a:t>2/20/15</a:t>
             </a:fld>
             <a:endParaRPr lang="en-US"/>
           </a:p>
@@ -2728,7 +2731,7 @@
           <a:p>
             <a:fld id="{6D427EF5-151B-9248-9B7F-B76F70F3FF39}" type="datetimeFigureOut">
               <a:rPr lang="en-US" smtClean="0"/>
-              <a:t>2/19/15</a:t>
+              <a:t>2/20/15</a:t>
             </a:fld>
             <a:endParaRPr lang="en-US"/>
           </a:p>
@@ -3155,6 +3158,17 @@
               <a:rPr lang="en-US" dirty="0" err="1" smtClean="0"/>
               <a:t>Yager</a:t>
             </a:r>
+            <a:endParaRPr lang="en-US" dirty="0" smtClean="0"/>
+          </a:p>
+          <a:p>
+            <a:r>
+              <a:rPr lang="en-US" dirty="0" smtClean="0"/>
+              <a:t>The ‘</a:t>
+            </a:r>
+            <a:r>
+              <a:rPr lang="en-US" smtClean="0"/>
+              <a:t>Pooters</a:t>
+            </a:r>
             <a:endParaRPr lang="en-US" dirty="0"/>
           </a:p>
         </p:txBody>
@@ -3176,6 +3190,228 @@
       </p:par>
     </p:tnLst>
   </p:timing>
+</p:sld>
+</file>
+
+<file path=ppt/slides/slide10.xml><?xml version="1.0" encoding="utf-8"?>
+<p:sld xmlns:a="http://schemas.openxmlformats.org/drawingml/2006/main" xmlns:r="http://schemas.openxmlformats.org/officeDocument/2006/relationships" xmlns:p="http://schemas.openxmlformats.org/presentationml/2006/main">
+  <p:cSld>
+    <p:spTree>
+      <p:nvGrpSpPr>
+        <p:cNvPr id="1" name=""/>
+        <p:cNvGrpSpPr/>
+        <p:nvPr/>
+      </p:nvGrpSpPr>
+      <p:grpSpPr>
+        <a:xfrm>
+          <a:off x="0" y="0"/>
+          <a:ext cx="0" cy="0"/>
+          <a:chOff x="0" y="0"/>
+          <a:chExt cx="0" cy="0"/>
+        </a:xfrm>
+      </p:grpSpPr>
+      <p:sp>
+        <p:nvSpPr>
+          <p:cNvPr id="2" name="Title 1"/>
+          <p:cNvSpPr>
+            <a:spLocks noGrp="1"/>
+          </p:cNvSpPr>
+          <p:nvPr>
+            <p:ph type="title"/>
+          </p:nvPr>
+        </p:nvSpPr>
+        <p:spPr/>
+        <p:txBody>
+          <a:bodyPr/>
+          <a:lstStyle/>
+          <a:p>
+            <a:r>
+              <a:rPr lang="en-US" dirty="0" smtClean="0"/>
+              <a:t>Ripple Carry</a:t>
+            </a:r>
+            <a:endParaRPr lang="en-US" dirty="0"/>
+          </a:p>
+        </p:txBody>
+      </p:sp>
+      <p:pic>
+        <p:nvPicPr>
+          <p:cNvPr id="4" name="Picture 3" descr="Screen Shot 2015-02-19 at 8.00.41 PM.png"/>
+          <p:cNvPicPr>
+            <a:picLocks noChangeAspect="1"/>
+          </p:cNvPicPr>
+          <p:nvPr/>
+        </p:nvPicPr>
+        <p:blipFill>
+          <a:blip r:embed="rId2">
+            <a:extLst>
+              <a:ext uri="{28A0092B-C50C-407E-A947-70E740481C1C}">
+                <a14:useLocalDpi xmlns:a14="http://schemas.microsoft.com/office/drawing/2010/main" val="0"/>
+              </a:ext>
+            </a:extLst>
+          </a:blip>
+          <a:stretch>
+            <a:fillRect/>
+          </a:stretch>
+        </p:blipFill>
+        <p:spPr>
+          <a:xfrm>
+            <a:off x="658689" y="1638300"/>
+            <a:ext cx="7912651" cy="4234094"/>
+          </a:xfrm>
+          <a:prstGeom prst="rect">
+            <a:avLst/>
+          </a:prstGeom>
+        </p:spPr>
+      </p:pic>
+    </p:spTree>
+    <p:extLst>
+      <p:ext uri="{BB962C8B-B14F-4D97-AF65-F5344CB8AC3E}">
+        <p14:creationId xmlns:p14="http://schemas.microsoft.com/office/powerpoint/2010/main" val="3632149858"/>
+      </p:ext>
+    </p:extLst>
+  </p:cSld>
+  <p:clrMapOvr>
+    <a:masterClrMapping/>
+  </p:clrMapOvr>
+</p:sld>
+</file>
+
+<file path=ppt/slides/slide11.xml><?xml version="1.0" encoding="utf-8"?>
+<p:sld xmlns:a="http://schemas.openxmlformats.org/drawingml/2006/main" xmlns:r="http://schemas.openxmlformats.org/officeDocument/2006/relationships" xmlns:p="http://schemas.openxmlformats.org/presentationml/2006/main">
+  <p:cSld>
+    <p:spTree>
+      <p:nvGrpSpPr>
+        <p:cNvPr id="1" name=""/>
+        <p:cNvGrpSpPr/>
+        <p:nvPr/>
+      </p:nvGrpSpPr>
+      <p:grpSpPr>
+        <a:xfrm>
+          <a:off x="0" y="0"/>
+          <a:ext cx="0" cy="0"/>
+          <a:chOff x="0" y="0"/>
+          <a:chExt cx="0" cy="0"/>
+        </a:xfrm>
+      </p:grpSpPr>
+      <p:pic>
+        <p:nvPicPr>
+          <p:cNvPr id="4" name="Picture 3" descr="Screen Shot 2015-02-19 at 8.13.43 PM.png"/>
+          <p:cNvPicPr>
+            <a:picLocks noChangeAspect="1"/>
+          </p:cNvPicPr>
+          <p:nvPr/>
+        </p:nvPicPr>
+        <p:blipFill>
+          <a:blip r:embed="rId2">
+            <a:extLst>
+              <a:ext uri="{28A0092B-C50C-407E-A947-70E740481C1C}">
+                <a14:useLocalDpi xmlns:a14="http://schemas.microsoft.com/office/drawing/2010/main" val="0"/>
+              </a:ext>
+            </a:extLst>
+          </a:blip>
+          <a:stretch>
+            <a:fillRect/>
+          </a:stretch>
+        </p:blipFill>
+        <p:spPr>
+          <a:xfrm>
+            <a:off x="1378716" y="494865"/>
+            <a:ext cx="6273249" cy="5789917"/>
+          </a:xfrm>
+          <a:prstGeom prst="rect">
+            <a:avLst/>
+          </a:prstGeom>
+        </p:spPr>
+      </p:pic>
+    </p:spTree>
+    <p:extLst>
+      <p:ext uri="{BB962C8B-B14F-4D97-AF65-F5344CB8AC3E}">
+        <p14:creationId xmlns:p14="http://schemas.microsoft.com/office/powerpoint/2010/main" val="8354240"/>
+      </p:ext>
+    </p:extLst>
+  </p:cSld>
+  <p:clrMapOvr>
+    <a:masterClrMapping/>
+  </p:clrMapOvr>
+</p:sld>
+</file>
+
+<file path=ppt/slides/slide12.xml><?xml version="1.0" encoding="utf-8"?>
+<p:sld xmlns:a="http://schemas.openxmlformats.org/drawingml/2006/main" xmlns:r="http://schemas.openxmlformats.org/officeDocument/2006/relationships" xmlns:p="http://schemas.openxmlformats.org/presentationml/2006/main">
+  <p:cSld>
+    <p:spTree>
+      <p:nvGrpSpPr>
+        <p:cNvPr id="1" name=""/>
+        <p:cNvGrpSpPr/>
+        <p:nvPr/>
+      </p:nvGrpSpPr>
+      <p:grpSpPr>
+        <a:xfrm>
+          <a:off x="0" y="0"/>
+          <a:ext cx="0" cy="0"/>
+          <a:chOff x="0" y="0"/>
+          <a:chExt cx="0" cy="0"/>
+        </a:xfrm>
+      </p:grpSpPr>
+      <p:sp>
+        <p:nvSpPr>
+          <p:cNvPr id="2" name="Title 1"/>
+          <p:cNvSpPr>
+            <a:spLocks noGrp="1"/>
+          </p:cNvSpPr>
+          <p:nvPr>
+            <p:ph type="title"/>
+          </p:nvPr>
+        </p:nvSpPr>
+        <p:spPr/>
+        <p:txBody>
+          <a:bodyPr/>
+          <a:lstStyle/>
+          <a:p>
+            <a:endParaRPr lang="en-US"/>
+          </a:p>
+        </p:txBody>
+      </p:sp>
+      <p:pic>
+        <p:nvPicPr>
+          <p:cNvPr id="4" name="Picture 3" descr="Screen Shot 2015-02-20 at 8.05.50 AM.png"/>
+          <p:cNvPicPr>
+            <a:picLocks noChangeAspect="1"/>
+          </p:cNvPicPr>
+          <p:nvPr/>
+        </p:nvPicPr>
+        <p:blipFill>
+          <a:blip r:embed="rId2">
+            <a:extLst>
+              <a:ext uri="{28A0092B-C50C-407E-A947-70E740481C1C}">
+                <a14:useLocalDpi xmlns:a14="http://schemas.microsoft.com/office/drawing/2010/main" val="0"/>
+              </a:ext>
+            </a:extLst>
+          </a:blip>
+          <a:stretch>
+            <a:fillRect/>
+          </a:stretch>
+        </p:blipFill>
+        <p:spPr>
+          <a:xfrm>
+            <a:off x="914400" y="1840041"/>
+            <a:ext cx="7302500" cy="3594100"/>
+          </a:xfrm>
+          <a:prstGeom prst="rect">
+            <a:avLst/>
+          </a:prstGeom>
+        </p:spPr>
+      </p:pic>
+    </p:spTree>
+    <p:extLst>
+      <p:ext uri="{BB962C8B-B14F-4D97-AF65-F5344CB8AC3E}">
+        <p14:creationId xmlns:p14="http://schemas.microsoft.com/office/powerpoint/2010/main" val="2830446147"/>
+      </p:ext>
+    </p:extLst>
+  </p:cSld>
+  <p:clrMapOvr>
+    <a:masterClrMapping/>
+  </p:clrMapOvr>
 </p:sld>
 </file>
 
@@ -3489,6 +3725,85 @@
           <a:bodyPr/>
           <a:lstStyle/>
           <a:p>
+            <a:endParaRPr lang="en-US"/>
+          </a:p>
+        </p:txBody>
+      </p:sp>
+      <p:pic>
+        <p:nvPicPr>
+          <p:cNvPr id="4" name="Picture 3" descr="Screen Shot 2015-02-20 at 8.06.04 AM.png"/>
+          <p:cNvPicPr>
+            <a:picLocks noChangeAspect="1"/>
+          </p:cNvPicPr>
+          <p:nvPr/>
+        </p:nvPicPr>
+        <p:blipFill>
+          <a:blip r:embed="rId2">
+            <a:extLst>
+              <a:ext uri="{28A0092B-C50C-407E-A947-70E740481C1C}">
+                <a14:useLocalDpi xmlns:a14="http://schemas.microsoft.com/office/drawing/2010/main" val="0"/>
+              </a:ext>
+            </a:extLst>
+          </a:blip>
+          <a:stretch>
+            <a:fillRect/>
+          </a:stretch>
+        </p:blipFill>
+        <p:spPr>
+          <a:xfrm>
+            <a:off x="579427" y="1138188"/>
+            <a:ext cx="7937792" cy="5400773"/>
+          </a:xfrm>
+          <a:prstGeom prst="rect">
+            <a:avLst/>
+          </a:prstGeom>
+        </p:spPr>
+      </p:pic>
+    </p:spTree>
+    <p:extLst>
+      <p:ext uri="{BB962C8B-B14F-4D97-AF65-F5344CB8AC3E}">
+        <p14:creationId xmlns:p14="http://schemas.microsoft.com/office/powerpoint/2010/main" val="4162833640"/>
+      </p:ext>
+    </p:extLst>
+  </p:cSld>
+  <p:clrMapOvr>
+    <a:masterClrMapping/>
+  </p:clrMapOvr>
+</p:sld>
+</file>
+
+<file path=ppt/slides/slide6.xml><?xml version="1.0" encoding="utf-8"?>
+<p:sld xmlns:a="http://schemas.openxmlformats.org/drawingml/2006/main" xmlns:r="http://schemas.openxmlformats.org/officeDocument/2006/relationships" xmlns:p="http://schemas.openxmlformats.org/presentationml/2006/main">
+  <p:cSld>
+    <p:spTree>
+      <p:nvGrpSpPr>
+        <p:cNvPr id="1" name=""/>
+        <p:cNvGrpSpPr/>
+        <p:nvPr/>
+      </p:nvGrpSpPr>
+      <p:grpSpPr>
+        <a:xfrm>
+          <a:off x="0" y="0"/>
+          <a:ext cx="0" cy="0"/>
+          <a:chOff x="0" y="0"/>
+          <a:chExt cx="0" cy="0"/>
+        </a:xfrm>
+      </p:grpSpPr>
+      <p:sp>
+        <p:nvSpPr>
+          <p:cNvPr id="2" name="Title 1"/>
+          <p:cNvSpPr>
+            <a:spLocks noGrp="1"/>
+          </p:cNvSpPr>
+          <p:nvPr>
+            <p:ph type="title"/>
+          </p:nvPr>
+        </p:nvSpPr>
+        <p:spPr/>
+        <p:txBody>
+          <a:bodyPr/>
+          <a:lstStyle/>
+          <a:p>
             <a:r>
               <a:rPr lang="en-US" dirty="0" smtClean="0"/>
               <a:t>Sign Extend</a:t>
@@ -3554,7 +3869,7 @@
 </p:sld>
 </file>
 
-<file path=ppt/slides/slide6.xml><?xml version="1.0" encoding="utf-8"?>
+<file path=ppt/slides/slide7.xml><?xml version="1.0" encoding="utf-8"?>
 <p:sld xmlns:a="http://schemas.openxmlformats.org/drawingml/2006/main" xmlns:r="http://schemas.openxmlformats.org/officeDocument/2006/relationships" xmlns:p="http://schemas.openxmlformats.org/presentationml/2006/main">
   <p:cSld>
     <p:spTree>
@@ -3644,96 +3959,6 @@
 </p:sld>
 </file>
 
-<file path=ppt/slides/slide7.xml><?xml version="1.0" encoding="utf-8"?>
-<p:sld xmlns:a="http://schemas.openxmlformats.org/drawingml/2006/main" xmlns:r="http://schemas.openxmlformats.org/officeDocument/2006/relationships" xmlns:p="http://schemas.openxmlformats.org/presentationml/2006/main">
-  <p:cSld>
-    <p:spTree>
-      <p:nvGrpSpPr>
-        <p:cNvPr id="1" name=""/>
-        <p:cNvGrpSpPr/>
-        <p:nvPr/>
-      </p:nvGrpSpPr>
-      <p:grpSpPr>
-        <a:xfrm>
-          <a:off x="0" y="0"/>
-          <a:ext cx="0" cy="0"/>
-          <a:chOff x="0" y="0"/>
-          <a:chExt cx="0" cy="0"/>
-        </a:xfrm>
-      </p:grpSpPr>
-      <p:sp>
-        <p:nvSpPr>
-          <p:cNvPr id="2" name="Title 1"/>
-          <p:cNvSpPr>
-            <a:spLocks noGrp="1"/>
-          </p:cNvSpPr>
-          <p:nvPr>
-            <p:ph type="title"/>
-          </p:nvPr>
-        </p:nvSpPr>
-        <p:spPr/>
-        <p:txBody>
-          <a:bodyPr/>
-          <a:lstStyle/>
-          <a:p>
-            <a:r>
-              <a:rPr lang="en-US" dirty="0" smtClean="0"/>
-              <a:t>Full Bit Adder</a:t>
-            </a:r>
-            <a:endParaRPr lang="en-US" dirty="0"/>
-          </a:p>
-        </p:txBody>
-      </p:sp>
-      <p:sp>
-        <p:nvSpPr>
-          <p:cNvPr id="3" name="Content Placeholder 2"/>
-          <p:cNvSpPr>
-            <a:spLocks noGrp="1"/>
-          </p:cNvSpPr>
-          <p:nvPr>
-            <p:ph idx="1"/>
-          </p:nvPr>
-        </p:nvSpPr>
-        <p:spPr/>
-        <p:txBody>
-          <a:bodyPr/>
-          <a:lstStyle/>
-          <a:p>
-            <a:r>
-              <a:rPr lang="en-US" dirty="0" smtClean="0"/>
-              <a:t>Function</a:t>
-            </a:r>
-          </a:p>
-          <a:p>
-            <a:pPr lvl="1"/>
-            <a:r>
-              <a:rPr lang="en-US" dirty="0" smtClean="0"/>
-              <a:t>Add 32 bit inputs</a:t>
-            </a:r>
-          </a:p>
-          <a:p>
-            <a:pPr lvl="1"/>
-            <a:r>
-              <a:rPr lang="en-US" dirty="0" smtClean="0"/>
-              <a:t>Ripple Carry</a:t>
-            </a:r>
-            <a:endParaRPr lang="en-US" dirty="0"/>
-          </a:p>
-        </p:txBody>
-      </p:sp>
-    </p:spTree>
-    <p:extLst>
-      <p:ext uri="{BB962C8B-B14F-4D97-AF65-F5344CB8AC3E}">
-        <p14:creationId xmlns:p14="http://schemas.microsoft.com/office/powerpoint/2010/main" val="1850111612"/>
-      </p:ext>
-    </p:extLst>
-  </p:cSld>
-  <p:clrMapOvr>
-    <a:masterClrMapping/>
-  </p:clrMapOvr>
-</p:sld>
-</file>
-
 <file path=ppt/slides/slide8.xml><?xml version="1.0" encoding="utf-8"?>
 <p:sld xmlns:a="http://schemas.openxmlformats.org/drawingml/2006/main" xmlns:r="http://schemas.openxmlformats.org/officeDocument/2006/relationships" xmlns:p="http://schemas.openxmlformats.org/presentationml/2006/main">
   <p:cSld>
@@ -3766,17 +3991,13 @@
           <a:bodyPr/>
           <a:lstStyle/>
           <a:p>
-            <a:r>
-              <a:rPr lang="en-US" dirty="0" smtClean="0"/>
-              <a:t>Ripple Carry</a:t>
-            </a:r>
-            <a:endParaRPr lang="en-US" dirty="0"/>
+            <a:endParaRPr lang="en-US"/>
           </a:p>
         </p:txBody>
       </p:sp>
       <p:pic>
         <p:nvPicPr>
-          <p:cNvPr id="4" name="Picture 3" descr="Screen Shot 2015-02-19 at 8.00.41 PM.png"/>
+          <p:cNvPr id="4" name="Picture 3" descr="Screen Shot 2015-02-20 at 8.05.40 AM.png"/>
           <p:cNvPicPr>
             <a:picLocks noChangeAspect="1"/>
           </p:cNvPicPr>
@@ -3796,8 +4017,8 @@
         </p:blipFill>
         <p:spPr>
           <a:xfrm>
-            <a:off x="658689" y="1638300"/>
-            <a:ext cx="7912651" cy="4234094"/>
+            <a:off x="1409700" y="1587500"/>
+            <a:ext cx="6324600" cy="3683000"/>
           </a:xfrm>
           <a:prstGeom prst="rect">
             <a:avLst/>
@@ -3807,7 +4028,7 @@
     </p:spTree>
     <p:extLst>
       <p:ext uri="{BB962C8B-B14F-4D97-AF65-F5344CB8AC3E}">
-        <p14:creationId xmlns:p14="http://schemas.microsoft.com/office/powerpoint/2010/main" val="3632149858"/>
+        <p14:creationId xmlns:p14="http://schemas.microsoft.com/office/powerpoint/2010/main" val="791031564"/>
       </p:ext>
     </p:extLst>
   </p:cSld>
@@ -3834,40 +4055,70 @@
           <a:chExt cx="0" cy="0"/>
         </a:xfrm>
       </p:grpSpPr>
-      <p:pic>
-        <p:nvPicPr>
-          <p:cNvPr id="4" name="Picture 3" descr="Screen Shot 2015-02-19 at 8.13.43 PM.png"/>
-          <p:cNvPicPr>
-            <a:picLocks noChangeAspect="1"/>
-          </p:cNvPicPr>
-          <p:nvPr/>
-        </p:nvPicPr>
-        <p:blipFill>
-          <a:blip r:embed="rId2">
-            <a:extLst>
-              <a:ext uri="{28A0092B-C50C-407E-A947-70E740481C1C}">
-                <a14:useLocalDpi xmlns:a14="http://schemas.microsoft.com/office/drawing/2010/main" val="0"/>
-              </a:ext>
-            </a:extLst>
-          </a:blip>
-          <a:stretch>
-            <a:fillRect/>
-          </a:stretch>
-        </p:blipFill>
-        <p:spPr>
-          <a:xfrm>
-            <a:off x="1378716" y="494865"/>
-            <a:ext cx="6273249" cy="5789917"/>
-          </a:xfrm>
-          <a:prstGeom prst="rect">
-            <a:avLst/>
-          </a:prstGeom>
-        </p:spPr>
-      </p:pic>
+      <p:sp>
+        <p:nvSpPr>
+          <p:cNvPr id="2" name="Title 1"/>
+          <p:cNvSpPr>
+            <a:spLocks noGrp="1"/>
+          </p:cNvSpPr>
+          <p:nvPr>
+            <p:ph type="title"/>
+          </p:nvPr>
+        </p:nvSpPr>
+        <p:spPr/>
+        <p:txBody>
+          <a:bodyPr/>
+          <a:lstStyle/>
+          <a:p>
+            <a:r>
+              <a:rPr lang="en-US" dirty="0" smtClean="0"/>
+              <a:t>Full Bit Adder</a:t>
+            </a:r>
+            <a:endParaRPr lang="en-US" dirty="0"/>
+          </a:p>
+        </p:txBody>
+      </p:sp>
+      <p:sp>
+        <p:nvSpPr>
+          <p:cNvPr id="3" name="Content Placeholder 2"/>
+          <p:cNvSpPr>
+            <a:spLocks noGrp="1"/>
+          </p:cNvSpPr>
+          <p:nvPr>
+            <p:ph idx="1"/>
+          </p:nvPr>
+        </p:nvSpPr>
+        <p:spPr/>
+        <p:txBody>
+          <a:bodyPr/>
+          <a:lstStyle/>
+          <a:p>
+            <a:r>
+              <a:rPr lang="en-US" dirty="0" smtClean="0"/>
+              <a:t>Function</a:t>
+            </a:r>
+          </a:p>
+          <a:p>
+            <a:pPr lvl="1"/>
+            <a:r>
+              <a:rPr lang="en-US" dirty="0" smtClean="0"/>
+              <a:t>Add 32 bit inputs</a:t>
+            </a:r>
+          </a:p>
+          <a:p>
+            <a:pPr lvl="1"/>
+            <a:r>
+              <a:rPr lang="en-US" dirty="0" smtClean="0"/>
+              <a:t>Ripple Carry</a:t>
+            </a:r>
+            <a:endParaRPr lang="en-US" dirty="0"/>
+          </a:p>
+        </p:txBody>
+      </p:sp>
     </p:spTree>
     <p:extLst>
       <p:ext uri="{BB962C8B-B14F-4D97-AF65-F5344CB8AC3E}">
-        <p14:creationId xmlns:p14="http://schemas.microsoft.com/office/powerpoint/2010/main" val="8354240"/>
+        <p14:creationId xmlns:p14="http://schemas.microsoft.com/office/powerpoint/2010/main" val="1850111612"/>
       </p:ext>
     </p:extLst>
   </p:cSld>

</xml_diff>